<commit_message>
Stacks and queues lab
</commit_message>
<xml_diff>
--- a/03. NEW C# Advanced NEW/01. Stacks and Queues/01. CSharp-Advanced-Stacks-and-Queues.pptx
+++ b/03. NEW C# Advanced NEW/01. Stacks and Queues/01. CSharp-Advanced-Stacks-and-Queues.pptx
@@ -319,7 +319,7 @@
           <a:p>
             <a:fld id="{4E087215-0C8F-4762-A664-737A353EC9A4}" type="datetimeFigureOut">
               <a:rPr lang="bg-BG" smtClean="0"/>
-              <a:t>9.3.2021 г.</a:t>
+              <a:t>26.4.2021 г.</a:t>
             </a:fld>
             <a:endParaRPr lang="bg-BG"/>
           </a:p>
@@ -510,7 +510,7 @@
           <a:p>
             <a:fld id="{72D84649-876A-46C9-8472-14CB09C070D8}" type="datetimeFigureOut">
               <a:rPr lang="en-US" smtClean="0"/>
-              <a:t>3/9/2021</a:t>
+              <a:t>4/26/2021</a:t>
             </a:fld>
             <a:endParaRPr lang="en-US"/>
           </a:p>
@@ -3263,7 +3263,7 @@
                 <a:hlinkClick r:id="rId2">
                   <a:extLst>
                     <a:ext uri="{A12FA001-AC4F-418D-AE19-62706E023703}">
-                      <ahyp:hlinkClr xmlns:ahyp="http://schemas.microsoft.com/office/drawing/2018/hyperlinkcolor" xmlns="" val="tx"/>
+                      <ahyp:hlinkClr xmlns:ahyp="http://schemas.microsoft.com/office/drawing/2018/hyperlinkcolor" val="tx"/>
                     </a:ext>
                   </a:extLst>
                 </a:hlinkClick>
@@ -14322,10 +14322,6 @@
               <a:rPr lang="en-US" dirty="0"/>
               <a:t>Implement a simple calculator that can evaluate simple </a:t>
             </a:r>
-            <a:r>
-              <a:rPr lang="bg-BG" dirty="0"/>
-              <a:t/>
-            </a:r>
             <a:br>
               <a:rPr lang="bg-BG" dirty="0"/>
             </a:br>
@@ -19904,14 +19900,6 @@
                 </a:solidFill>
               </a:rPr>
               <a:t>given an arithmetic expression </a:t>
-            </a:r>
-            <a:r>
-              <a:rPr lang="en-US" sz="3600" dirty="0">
-                <a:solidFill>
-                  <a:schemeClr val="bg1"/>
-                </a:solidFill>
-              </a:rPr>
-              <a:t/>
             </a:r>
             <a:br>
               <a:rPr lang="en-US" sz="3600" dirty="0">
@@ -21396,21 +21384,13 @@
             <a:pPr lvl="1"/>
             <a:r>
               <a:rPr lang="en-US" sz="3400" dirty="0"/>
-              <a:t>Enqueue(), Dequeue(), Peek</a:t>
-            </a:r>
-            <a:r>
-              <a:rPr lang="en-US" sz="3400" dirty="0" smtClean="0"/>
-              <a:t>(),</a:t>
-            </a:r>
-            <a:r>
-              <a:rPr lang="bg-BG" sz="3400" dirty="0"/>
-              <a:t/>
+              <a:t>Enqueue(), Dequeue(), Peek(),</a:t>
             </a:r>
             <a:br>
               <a:rPr lang="bg-BG" sz="3400" dirty="0"/>
             </a:br>
             <a:r>
-              <a:rPr lang="en-US" sz="3400" dirty="0" err="1" smtClean="0"/>
+              <a:rPr lang="en-US" sz="3400" dirty="0" err="1"/>
               <a:t>ToArray</a:t>
             </a:r>
             <a:r>
@@ -21664,24 +21644,12 @@
           <a:bodyPr/>
           <a:lstStyle/>
           <a:p>
-            <a:r>
-              <a:rPr lang="bg-BG" dirty="0" smtClean="0"/>
-              <a:t/>
-            </a:r>
             <a:br>
-              <a:rPr lang="bg-BG" dirty="0" smtClean="0"/>
+              <a:rPr lang="bg-BG" dirty="0"/>
             </a:br>
             <a:r>
-              <a:rPr lang="en-US" dirty="0" smtClean="0"/>
-              <a:t>Queue&lt;T</a:t>
-            </a:r>
-            <a:r>
               <a:rPr lang="en-US" dirty="0"/>
-              <a:t>&gt;</a:t>
-            </a:r>
-            <a:r>
-              <a:rPr lang="bg-BG" dirty="0"/>
-              <a:t/>
+              <a:t>Queue&lt;T&gt;</a:t>
             </a:r>
             <a:br>
               <a:rPr lang="bg-BG" dirty="0"/>
@@ -34916,24 +34884,12 @@
           <a:bodyPr/>
           <a:lstStyle/>
           <a:p>
-            <a:r>
-              <a:rPr lang="bg-BG" dirty="0" smtClean="0"/>
-              <a:t/>
-            </a:r>
             <a:br>
-              <a:rPr lang="bg-BG" dirty="0" smtClean="0"/>
+              <a:rPr lang="bg-BG" dirty="0"/>
             </a:br>
             <a:r>
-              <a:rPr lang="en-US" dirty="0" smtClean="0"/>
-              <a:t>Stack&lt;T</a:t>
-            </a:r>
-            <a:r>
               <a:rPr lang="en-US" dirty="0"/>
-              <a:t>&gt;</a:t>
-            </a:r>
-            <a:r>
-              <a:rPr lang="bg-BG" dirty="0"/>
-              <a:t/>
+              <a:t>Stack&lt;T&gt;</a:t>
             </a:r>
             <a:br>
               <a:rPr lang="bg-BG" dirty="0"/>

</xml_diff>